<commit_message>
Finish prep for Sept 1 preso
</commit_message>
<xml_diff>
--- a/warner-azure-blueprints.pptx
+++ b/warner-azure-blueprints.pptx
@@ -243,7 +243,7 @@
           <a:p>
             <a:fld id="{BE1B5227-671A-4331-BA8E-6A194D65408B}" type="datetimeFigureOut">
               <a:rPr lang="en-US" smtClean="0"/>
-              <a:t>8/31/2020</a:t>
+              <a:t>9/1/2020</a:t>
             </a:fld>
             <a:endParaRPr lang="en-US"/>
           </a:p>
@@ -408,7 +408,7 @@
           <a:p>
             <a:fld id="{27872E6B-C85C-424E-AD51-4389090A2C7D}" type="datetimeFigureOut">
               <a:rPr lang="en-US" smtClean="0"/>
-              <a:t>8/31/2020</a:t>
+              <a:t>9/1/2020</a:t>
             </a:fld>
             <a:endParaRPr lang="en-US"/>
           </a:p>

</xml_diff>